<commit_message>
final add-correction in foundation page
</commit_message>
<xml_diff>
--- a/ppt/BLOOM Project-2.pptx
+++ b/ppt/BLOOM Project-2.pptx
@@ -264,7 +264,7 @@
           <a:p>
             <a:fld id="{BC315F06-8DF5-42B5-A105-D3981895ABA8}" type="datetimeFigureOut">
               <a:rPr lang="en-US" smtClean="0"/>
-              <a:t>5/17/2021</a:t>
+              <a:t>5/20/2021</a:t>
             </a:fld>
             <a:endParaRPr lang="en-US"/>
           </a:p>
@@ -462,7 +462,7 @@
           <a:p>
             <a:fld id="{BC315F06-8DF5-42B5-A105-D3981895ABA8}" type="datetimeFigureOut">
               <a:rPr lang="en-US" smtClean="0"/>
-              <a:t>5/17/2021</a:t>
+              <a:t>5/20/2021</a:t>
             </a:fld>
             <a:endParaRPr lang="en-US"/>
           </a:p>
@@ -670,7 +670,7 @@
           <a:p>
             <a:fld id="{BC315F06-8DF5-42B5-A105-D3981895ABA8}" type="datetimeFigureOut">
               <a:rPr lang="en-US" smtClean="0"/>
-              <a:t>5/17/2021</a:t>
+              <a:t>5/20/2021</a:t>
             </a:fld>
             <a:endParaRPr lang="en-US"/>
           </a:p>
@@ -868,7 +868,7 @@
           <a:p>
             <a:fld id="{BC315F06-8DF5-42B5-A105-D3981895ABA8}" type="datetimeFigureOut">
               <a:rPr lang="en-US" smtClean="0"/>
-              <a:t>5/17/2021</a:t>
+              <a:t>5/20/2021</a:t>
             </a:fld>
             <a:endParaRPr lang="en-US"/>
           </a:p>
@@ -1143,7 +1143,7 @@
           <a:p>
             <a:fld id="{BC315F06-8DF5-42B5-A105-D3981895ABA8}" type="datetimeFigureOut">
               <a:rPr lang="en-US" smtClean="0"/>
-              <a:t>5/17/2021</a:t>
+              <a:t>5/20/2021</a:t>
             </a:fld>
             <a:endParaRPr lang="en-US"/>
           </a:p>
@@ -1408,7 +1408,7 @@
           <a:p>
             <a:fld id="{BC315F06-8DF5-42B5-A105-D3981895ABA8}" type="datetimeFigureOut">
               <a:rPr lang="en-US" smtClean="0"/>
-              <a:t>5/17/2021</a:t>
+              <a:t>5/20/2021</a:t>
             </a:fld>
             <a:endParaRPr lang="en-US"/>
           </a:p>
@@ -1820,7 +1820,7 @@
           <a:p>
             <a:fld id="{BC315F06-8DF5-42B5-A105-D3981895ABA8}" type="datetimeFigureOut">
               <a:rPr lang="en-US" smtClean="0"/>
-              <a:t>5/17/2021</a:t>
+              <a:t>5/20/2021</a:t>
             </a:fld>
             <a:endParaRPr lang="en-US"/>
           </a:p>
@@ -1961,7 +1961,7 @@
           <a:p>
             <a:fld id="{BC315F06-8DF5-42B5-A105-D3981895ABA8}" type="datetimeFigureOut">
               <a:rPr lang="en-US" smtClean="0"/>
-              <a:t>5/17/2021</a:t>
+              <a:t>5/20/2021</a:t>
             </a:fld>
             <a:endParaRPr lang="en-US"/>
           </a:p>
@@ -2074,7 +2074,7 @@
           <a:p>
             <a:fld id="{BC315F06-8DF5-42B5-A105-D3981895ABA8}" type="datetimeFigureOut">
               <a:rPr lang="en-US" smtClean="0"/>
-              <a:t>5/17/2021</a:t>
+              <a:t>5/20/2021</a:t>
             </a:fld>
             <a:endParaRPr lang="en-US"/>
           </a:p>
@@ -2385,7 +2385,7 @@
           <a:p>
             <a:fld id="{BC315F06-8DF5-42B5-A105-D3981895ABA8}" type="datetimeFigureOut">
               <a:rPr lang="en-US" smtClean="0"/>
-              <a:t>5/17/2021</a:t>
+              <a:t>5/20/2021</a:t>
             </a:fld>
             <a:endParaRPr lang="en-US"/>
           </a:p>
@@ -2673,7 +2673,7 @@
           <a:p>
             <a:fld id="{BC315F06-8DF5-42B5-A105-D3981895ABA8}" type="datetimeFigureOut">
               <a:rPr lang="en-US" smtClean="0"/>
-              <a:t>5/17/2021</a:t>
+              <a:t>5/20/2021</a:t>
             </a:fld>
             <a:endParaRPr lang="en-US"/>
           </a:p>
@@ -2914,7 +2914,7 @@
           <a:p>
             <a:fld id="{BC315F06-8DF5-42B5-A105-D3981895ABA8}" type="datetimeFigureOut">
               <a:rPr lang="en-US" smtClean="0"/>
-              <a:t>5/17/2021</a:t>
+              <a:t>5/20/2021</a:t>
             </a:fld>
             <a:endParaRPr lang="en-US"/>
           </a:p>
@@ -3746,66 +3746,6 @@
           </a:p>
         </p:txBody>
       </p:sp>
-      <p:sp>
-        <p:nvSpPr>
-          <p:cNvPr id="2" name="Title 1">
-            <a:extLst>
-              <a:ext uri="{FF2B5EF4-FFF2-40B4-BE49-F238E27FC236}">
-                <a16:creationId xmlns:a16="http://schemas.microsoft.com/office/drawing/2014/main" id="{4624579B-BA9F-400F-9688-1198EBBE80D5}"/>
-              </a:ext>
-            </a:extLst>
-          </p:cNvPr>
-          <p:cNvSpPr>
-            <a:spLocks noGrp="1"/>
-          </p:cNvSpPr>
-          <p:nvPr>
-            <p:ph type="ctrTitle"/>
-          </p:nvPr>
-        </p:nvSpPr>
-        <p:spPr>
-          <a:xfrm>
-            <a:off x="886437" y="5664200"/>
-            <a:ext cx="9144000" cy="2387600"/>
-          </a:xfrm>
-        </p:spPr>
-        <p:txBody>
-          <a:bodyPr/>
-          <a:lstStyle/>
-          <a:p>
-            <a:endParaRPr lang="en-US"/>
-          </a:p>
-        </p:txBody>
-      </p:sp>
-      <p:sp>
-        <p:nvSpPr>
-          <p:cNvPr id="3" name="Subtitle 2">
-            <a:extLst>
-              <a:ext uri="{FF2B5EF4-FFF2-40B4-BE49-F238E27FC236}">
-                <a16:creationId xmlns:a16="http://schemas.microsoft.com/office/drawing/2014/main" id="{18029108-7ABD-4B9F-82FD-52F4B36B3D3B}"/>
-              </a:ext>
-            </a:extLst>
-          </p:cNvPr>
-          <p:cNvSpPr>
-            <a:spLocks noGrp="1"/>
-          </p:cNvSpPr>
-          <p:nvPr>
-            <p:ph type="subTitle" idx="1"/>
-          </p:nvPr>
-        </p:nvSpPr>
-        <p:spPr>
-          <a:xfrm>
-            <a:off x="886437" y="8143875"/>
-            <a:ext cx="9144000" cy="1655762"/>
-          </a:xfrm>
-        </p:spPr>
-        <p:txBody>
-          <a:bodyPr/>
-          <a:lstStyle/>
-          <a:p>
-            <a:endParaRPr lang="en-US"/>
-          </a:p>
-        </p:txBody>
-      </p:sp>
       <p:pic>
         <p:nvPicPr>
           <p:cNvPr id="7" name="Picture 6">

</xml_diff>